<commit_message>
GUI: changed Error -> Fehler, Doc: replaced gif
</commit_message>
<xml_diff>
--- a/dokumentation/bof31844/Folien-Florian-Boemmel.pptx
+++ b/dokumentation/bof31844/Folien-Florian-Boemmel.pptx
@@ -6828,6 +6828,11 @@
 <file path=ppt/slides/slide1.xml><?xml version="1.0" encoding="utf-8"?>
 <p:sld xmlns:a="http://schemas.openxmlformats.org/drawingml/2006/main" xmlns:r="http://schemas.openxmlformats.org/officeDocument/2006/relationships" xmlns:p="http://schemas.openxmlformats.org/presentationml/2006/main">
   <p:cSld>
+    <p:bg>
+      <p:bgRef idx="1001">
+        <a:schemeClr val="bg1"/>
+      </p:bgRef>
+    </p:bg>
     <p:spTree>
       <p:nvGrpSpPr>
         <p:cNvPr id="1" name=""/>
@@ -6945,7 +6950,7 @@
           <p:nvPr/>
         </p:nvPicPr>
         <p:blipFill>
-          <a:blip r:embed="rId2">
+          <a:blip r:embed="rId3">
             <a:extLst>
               <a:ext uri="{28A0092B-C50C-407E-A947-70E740481C1C}">
                 <a14:useLocalDpi xmlns:a14="http://schemas.microsoft.com/office/drawing/2010/main" val="0"/>
@@ -7021,7 +7026,7 @@
     </p:extLst>
   </p:cSld>
   <p:clrMapOvr>
-    <a:masterClrMapping/>
+    <a:overrideClrMapping bg1="lt1" tx1="dk1" bg2="lt2" tx2="dk2" accent1="accent1" accent2="accent2" accent3="accent3" accent4="accent4" accent5="accent5" accent6="accent6" hlink="hlink" folHlink="folHlink"/>
   </p:clrMapOvr>
 </p:sld>
 </file>
@@ -7532,7 +7537,7 @@
             </a:pPr>
             <a:r>
               <a:rPr lang="de-DE" dirty="0"/>
-              <a:t>Blinkt bei Warnungen / Errors</a:t>
+              <a:t>Blinkt bei Warnungen / Fehler</a:t>
             </a:r>
           </a:p>
           <a:p>
@@ -7721,41 +7726,6 @@
           <a:chExt cx="0" cy="0"/>
         </a:xfrm>
       </p:grpSpPr>
-      <p:pic>
-        <p:nvPicPr>
-          <p:cNvPr id="6" name="Inhaltsplatzhalter 5">
-            <a:extLst>
-              <a:ext uri="{FF2B5EF4-FFF2-40B4-BE49-F238E27FC236}">
-                <a16:creationId xmlns:a16="http://schemas.microsoft.com/office/drawing/2014/main" id="{A8669A3B-20AC-4646-81CB-2F436E519467}"/>
-              </a:ext>
-            </a:extLst>
-          </p:cNvPr>
-          <p:cNvPicPr>
-            <a:picLocks noGrp="1" noChangeAspect="1"/>
-          </p:cNvPicPr>
-          <p:nvPr>
-            <p:ph idx="1"/>
-          </p:nvPr>
-        </p:nvPicPr>
-        <p:blipFill>
-          <a:blip r:embed="rId2">
-            <a:extLst>
-              <a:ext uri="{28A0092B-C50C-407E-A947-70E740481C1C}">
-                <a14:useLocalDpi xmlns:a14="http://schemas.microsoft.com/office/drawing/2010/main" val="0"/>
-              </a:ext>
-            </a:extLst>
-          </a:blip>
-          <a:stretch>
-            <a:fillRect/>
-          </a:stretch>
-        </p:blipFill>
-        <p:spPr>
-          <a:xfrm>
-            <a:off x="5800723" y="1923725"/>
-            <a:ext cx="3048000" cy="2257425"/>
-          </a:xfrm>
-        </p:spPr>
-      </p:pic>
       <p:sp>
         <p:nvSpPr>
           <p:cNvPr id="3" name="Inhaltsplatzhalter 2">
@@ -7779,7 +7749,7 @@
           <a:p>
             <a:r>
               <a:rPr lang="de-DE" dirty="0"/>
-              <a:t>Warnungen und Errors</a:t>
+              <a:t>Warnungen und Fehler</a:t>
             </a:r>
           </a:p>
         </p:txBody>
@@ -7828,7 +7798,7 @@
           <p:nvPr/>
         </p:nvPicPr>
         <p:blipFill>
-          <a:blip r:embed="rId3">
+          <a:blip r:embed="rId2">
             <a:extLst>
               <a:ext uri="{28A0092B-C50C-407E-A947-70E740481C1C}">
                 <a14:useLocalDpi xmlns:a14="http://schemas.microsoft.com/office/drawing/2010/main" val="0"/>
@@ -7906,10 +7876,45 @@
       </p:sp>
       <p:pic>
         <p:nvPicPr>
-          <p:cNvPr id="11" name="Grafik 10">
+          <p:cNvPr id="10" name="Inhaltsplatzhalter 9">
             <a:extLst>
               <a:ext uri="{FF2B5EF4-FFF2-40B4-BE49-F238E27FC236}">
-                <a16:creationId xmlns:a16="http://schemas.microsoft.com/office/drawing/2014/main" id="{42C24FB3-6714-432F-8F27-AC5C27C90A32}"/>
+                <a16:creationId xmlns:a16="http://schemas.microsoft.com/office/drawing/2014/main" id="{EC745AFF-DDAA-46A3-B261-97386C4D6F4C}"/>
+              </a:ext>
+            </a:extLst>
+          </p:cNvPr>
+          <p:cNvPicPr>
+            <a:picLocks noGrp="1" noChangeAspect="1"/>
+          </p:cNvPicPr>
+          <p:nvPr>
+            <p:ph idx="1"/>
+          </p:nvPr>
+        </p:nvPicPr>
+        <p:blipFill>
+          <a:blip r:embed="rId3">
+            <a:extLst>
+              <a:ext uri="{28A0092B-C50C-407E-A947-70E740481C1C}">
+                <a14:useLocalDpi xmlns:a14="http://schemas.microsoft.com/office/drawing/2010/main" val="0"/>
+              </a:ext>
+            </a:extLst>
+          </a:blip>
+          <a:stretch>
+            <a:fillRect/>
+          </a:stretch>
+        </p:blipFill>
+        <p:spPr>
+          <a:xfrm>
+            <a:off x="5800723" y="1840944"/>
+            <a:ext cx="3197609" cy="2340206"/>
+          </a:xfrm>
+        </p:spPr>
+      </p:pic>
+      <p:pic>
+        <p:nvPicPr>
+          <p:cNvPr id="12" name="Grafik 11">
+            <a:extLst>
+              <a:ext uri="{FF2B5EF4-FFF2-40B4-BE49-F238E27FC236}">
+                <a16:creationId xmlns:a16="http://schemas.microsoft.com/office/drawing/2014/main" id="{D5EEE7CD-6507-4DC4-B954-DD4C94B9E81C}"/>
               </a:ext>
             </a:extLst>
           </p:cNvPr>
@@ -7926,8 +7931,8 @@
         </p:blipFill>
         <p:spPr>
           <a:xfrm>
-            <a:off x="2908471" y="4700356"/>
-            <a:ext cx="3305175" cy="419100"/>
+            <a:off x="2917372" y="4850606"/>
+            <a:ext cx="3219450" cy="333375"/>
           </a:xfrm>
           <a:prstGeom prst="rect">
             <a:avLst/>
@@ -9549,4 +9554,47 @@
     </a:ext>
   </a:extLst>
 </a:theme>
+</file>
+
+<file path=ppt/theme/themeOverride1.xml><?xml version="1.0" encoding="utf-8"?>
+<a:themeOverride xmlns:a="http://schemas.openxmlformats.org/drawingml/2006/main">
+  <a:clrScheme name="Office Theme">
+    <a:dk1>
+      <a:sysClr val="windowText" lastClr="000000"/>
+    </a:dk1>
+    <a:lt1>
+      <a:sysClr val="window" lastClr="FFFFFF"/>
+    </a:lt1>
+    <a:dk2>
+      <a:srgbClr val="44546A"/>
+    </a:dk2>
+    <a:lt2>
+      <a:srgbClr val="E7E6E6"/>
+    </a:lt2>
+    <a:accent1>
+      <a:srgbClr val="5B9BD5"/>
+    </a:accent1>
+    <a:accent2>
+      <a:srgbClr val="ED7D31"/>
+    </a:accent2>
+    <a:accent3>
+      <a:srgbClr val="A5A5A5"/>
+    </a:accent3>
+    <a:accent4>
+      <a:srgbClr val="FFC000"/>
+    </a:accent4>
+    <a:accent5>
+      <a:srgbClr val="4472C4"/>
+    </a:accent5>
+    <a:accent6>
+      <a:srgbClr val="70AD47"/>
+    </a:accent6>
+    <a:hlink>
+      <a:srgbClr val="0563C1"/>
+    </a:hlink>
+    <a:folHlink>
+      <a:srgbClr val="954F72"/>
+    </a:folHlink>
+  </a:clrScheme>
+</a:themeOverride>
 </file>
</xml_diff>